<commit_message>
Updates for demo 5
</commit_message>
<xml_diff>
--- a/Documentation/Presentations/MAU Tech - Demo 3.pptx
+++ b/Documentation/Presentations/MAU Tech - Demo 3.pptx
@@ -220,7 +220,7 @@
           <a:p>
             <a:fld id="{BE3EE897-F72E-4A2F-ADB1-49F9F5582FC6}" type="datetimeFigureOut">
               <a:rPr lang="en-ZA" smtClean="0"/>
-              <a:t>2014/08/22</a:t>
+              <a:t>2014-10-03</a:t>
             </a:fld>
             <a:endParaRPr lang="en-ZA"/>
           </a:p>
@@ -676,7 +676,7 @@
             <a:fld id="{1D8BD707-D9CF-40AE-B4C6-C98DA3205C09}" type="datetimeFigureOut">
               <a:rPr lang="en-US" smtClean="0"/>
               <a:pPr/>
-              <a:t>8/22/2014</a:t>
+              <a:t>10/3/2014</a:t>
             </a:fld>
             <a:endParaRPr lang="en-US"/>
           </a:p>
@@ -843,7 +843,7 @@
             <a:fld id="{1D8BD707-D9CF-40AE-B4C6-C98DA3205C09}" type="datetimeFigureOut">
               <a:rPr lang="en-US" smtClean="0"/>
               <a:pPr/>
-              <a:t>8/22/2014</a:t>
+              <a:t>10/3/2014</a:t>
             </a:fld>
             <a:endParaRPr lang="en-US"/>
           </a:p>
@@ -1020,7 +1020,7 @@
             <a:fld id="{1D8BD707-D9CF-40AE-B4C6-C98DA3205C09}" type="datetimeFigureOut">
               <a:rPr lang="en-US" smtClean="0"/>
               <a:pPr/>
-              <a:t>8/22/2014</a:t>
+              <a:t>10/3/2014</a:t>
             </a:fld>
             <a:endParaRPr lang="en-US"/>
           </a:p>
@@ -1187,7 +1187,7 @@
             <a:fld id="{1D8BD707-D9CF-40AE-B4C6-C98DA3205C09}" type="datetimeFigureOut">
               <a:rPr lang="en-US" smtClean="0"/>
               <a:pPr/>
-              <a:t>8/22/2014</a:t>
+              <a:t>10/3/2014</a:t>
             </a:fld>
             <a:endParaRPr lang="en-US"/>
           </a:p>
@@ -1428,7 +1428,7 @@
             <a:fld id="{1D8BD707-D9CF-40AE-B4C6-C98DA3205C09}" type="datetimeFigureOut">
               <a:rPr lang="en-US" smtClean="0"/>
               <a:pPr/>
-              <a:t>8/22/2014</a:t>
+              <a:t>10/3/2014</a:t>
             </a:fld>
             <a:endParaRPr lang="en-US"/>
           </a:p>
@@ -1520,7 +1520,7 @@
             <a:fld id="{1D8BD707-D9CF-40AE-B4C6-C98DA3205C09}" type="datetimeFigureOut">
               <a:rPr lang="en-US" smtClean="0"/>
               <a:pPr/>
-              <a:t>8/22/2014</a:t>
+              <a:t>10/3/2014</a:t>
             </a:fld>
             <a:endParaRPr lang="en-US"/>
           </a:p>
@@ -1896,7 +1896,7 @@
             <a:fld id="{1D8BD707-D9CF-40AE-B4C6-C98DA3205C09}" type="datetimeFigureOut">
               <a:rPr lang="en-US" smtClean="0"/>
               <a:pPr/>
-              <a:t>8/22/2014</a:t>
+              <a:t>10/3/2014</a:t>
             </a:fld>
             <a:endParaRPr lang="en-US"/>
           </a:p>
@@ -2153,7 +2153,7 @@
             <a:fld id="{1D8BD707-D9CF-40AE-B4C6-C98DA3205C09}" type="datetimeFigureOut">
               <a:rPr lang="en-US" smtClean="0"/>
               <a:pPr/>
-              <a:t>8/22/2014</a:t>
+              <a:t>10/3/2014</a:t>
             </a:fld>
             <a:endParaRPr lang="en-US"/>
           </a:p>
@@ -2245,7 +2245,7 @@
             <a:fld id="{1D8BD707-D9CF-40AE-B4C6-C98DA3205C09}" type="datetimeFigureOut">
               <a:rPr lang="en-US" smtClean="0"/>
               <a:pPr/>
-              <a:t>8/22/2014</a:t>
+              <a:t>10/3/2014</a:t>
             </a:fld>
             <a:endParaRPr lang="en-US"/>
           </a:p>
@@ -2521,7 +2521,7 @@
             <a:fld id="{1D8BD707-D9CF-40AE-B4C6-C98DA3205C09}" type="datetimeFigureOut">
               <a:rPr lang="en-US" smtClean="0"/>
               <a:pPr/>
-              <a:t>8/22/2014</a:t>
+              <a:t>10/3/2014</a:t>
             </a:fld>
             <a:endParaRPr lang="en-US"/>
           </a:p>
@@ -2795,7 +2795,7 @@
             <a:fld id="{1D8BD707-D9CF-40AE-B4C6-C98DA3205C09}" type="datetimeFigureOut">
               <a:rPr lang="en-US" smtClean="0"/>
               <a:pPr/>
-              <a:t>8/22/2014</a:t>
+              <a:t>10/3/2014</a:t>
             </a:fld>
             <a:endParaRPr lang="en-US"/>
           </a:p>
@@ -3097,7 +3097,7 @@
             <a:fld id="{1D8BD707-D9CF-40AE-B4C6-C98DA3205C09}" type="datetimeFigureOut">
               <a:rPr lang="en-US" smtClean="0"/>
               <a:pPr/>
-              <a:t>8/22/2014</a:t>
+              <a:t>10/3/2014</a:t>
             </a:fld>
             <a:endParaRPr lang="en-US"/>
           </a:p>
@@ -3559,40 +3559,17 @@
         </p:nvSpPr>
         <p:spPr>
           <a:xfrm>
-            <a:off x="914400" y="457200"/>
-            <a:ext cx="7315200" cy="4654449"/>
+            <a:off x="914400" y="457201"/>
+            <a:ext cx="7315200" cy="2057400"/>
           </a:xfrm>
         </p:spPr>
         <p:txBody>
-          <a:bodyPr/>
+          <a:bodyPr>
+            <a:normAutofit/>
+          </a:bodyPr>
           <a:lstStyle/>
           <a:p>
             <a:pPr algn="ctr"/>
-            <a:r>
-              <a:rPr lang="en-ZA" dirty="0" smtClean="0"/>
-              <a:t>COS 301</a:t>
-            </a:r>
-            <a:br>
-              <a:rPr lang="en-ZA" dirty="0" smtClean="0"/>
-            </a:br>
-            <a:r>
-              <a:rPr lang="en-ZA" dirty="0"/>
-              <a:t>&amp;</a:t>
-            </a:r>
-            <a:r>
-              <a:rPr lang="en-ZA" dirty="0" smtClean="0"/>
-              <a:t/>
-            </a:r>
-            <a:br>
-              <a:rPr lang="en-ZA" dirty="0" smtClean="0"/>
-            </a:br>
-            <a:r>
-              <a:rPr lang="en-ZA" dirty="0" smtClean="0"/>
-              <a:t>DVT</a:t>
-            </a:r>
-            <a:br>
-              <a:rPr lang="en-ZA" dirty="0" smtClean="0"/>
-            </a:br>
             <a:r>
               <a:rPr lang="en-ZA" dirty="0" smtClean="0"/>
               <a:t>Kinder Finder</a:t>
@@ -3626,7 +3603,7 @@
         </p:spPr>
         <p:txBody>
           <a:bodyPr>
-            <a:normAutofit fontScale="92500" lnSpcReduction="10000"/>
+            <a:normAutofit/>
           </a:bodyPr>
           <a:lstStyle/>
           <a:p>
@@ -3646,8 +3623,13 @@
           <a:p>
             <a:r>
               <a:rPr lang="en-ZA" dirty="0" smtClean="0"/>
-              <a:t>Michael Johnston	12053300	Lead Programmer</a:t>
-            </a:r>
+              <a:t>Michael Johnston	</a:t>
+            </a:r>
+            <a:r>
+              <a:rPr lang="en-ZA" dirty="0" smtClean="0"/>
+              <a:t>12053300</a:t>
+            </a:r>
+            <a:endParaRPr lang="en-ZA" dirty="0" smtClean="0"/>
           </a:p>
           <a:p>
             <a:r>
@@ -3655,17 +3637,43 @@
               <a:t>Po-Han Chiu (Arthur)	</a:t>
             </a:r>
             <a:r>
-              <a:rPr lang="en-ZA" dirty="0"/>
-              <a:t>11063612 </a:t>
-            </a:r>
-            <a:r>
-              <a:rPr lang="en-ZA" dirty="0" smtClean="0"/>
-              <a:t>	Psychological Counsellor	</a:t>
+              <a:rPr lang="en-ZA" dirty="0" smtClean="0"/>
+              <a:t>11063612</a:t>
             </a:r>
             <a:endParaRPr lang="en-ZA" dirty="0"/>
           </a:p>
         </p:txBody>
       </p:sp>
+      <p:pic>
+        <p:nvPicPr>
+          <p:cNvPr id="4" name="Picture 3"/>
+          <p:cNvPicPr>
+            <a:picLocks noChangeAspect="1"/>
+          </p:cNvPicPr>
+          <p:nvPr/>
+        </p:nvPicPr>
+        <p:blipFill>
+          <a:blip r:embed="rId2">
+            <a:extLst>
+              <a:ext uri="{28A0092B-C50C-407E-A947-70E740481C1C}">
+                <a14:useLocalDpi xmlns:a14="http://schemas.microsoft.com/office/drawing/2010/main" val="0"/>
+              </a:ext>
+            </a:extLst>
+          </a:blip>
+          <a:stretch>
+            <a:fillRect/>
+          </a:stretch>
+        </p:blipFill>
+        <p:spPr>
+          <a:xfrm>
+            <a:off x="2524125" y="2594011"/>
+            <a:ext cx="4095750" cy="1520897"/>
+          </a:xfrm>
+          <a:prstGeom prst="rect">
+            <a:avLst/>
+          </a:prstGeom>
+        </p:spPr>
+      </p:pic>
     </p:spTree>
     <p:extLst>
       <p:ext uri="{BB962C8B-B14F-4D97-AF65-F5344CB8AC3E}">
@@ -4298,11 +4306,6 @@
               </a:rPr>
               <a:t>mrbean@gmail.com</a:t>
             </a:r>
-            <a:endParaRPr lang="en-ZA" b="1" i="1" dirty="0" smtClean="0">
-              <a:solidFill>
-                <a:schemeClr val="tx2"/>
-              </a:solidFill>
-            </a:endParaRPr>
           </a:p>
           <a:p>
             <a:pPr lvl="1"/>

</xml_diff>